<commit_message>
added py if else statements lesson and updated word blocks lesson
</commit_message>
<xml_diff>
--- a/en/ProgrammingLessons/IfThenBlocks.pptx
+++ b/en/ProgrammingLessons/IfThenBlocks.pptx
@@ -217,7 +217,7 @@
           <a:p>
             <a:fld id="{58040048-1E4D-CD41-AC49-0750EB72586B}" type="datetimeFigureOut">
               <a:rPr lang="en-US" smtClean="0"/>
-              <a:t>01/08/2020</a:t>
+              <a:t>11/23/2020</a:t>
             </a:fld>
             <a:endParaRPr lang="en-US"/>
           </a:p>
@@ -383,7 +383,7 @@
           <a:p>
             <a:fld id="{2B8484CF-5098-F24E-8881-583515D5C406}" type="datetimeFigureOut">
               <a:rPr lang="en-US" smtClean="0"/>
-              <a:t>01/08/2020</a:t>
+              <a:t>11/23/2020</a:t>
             </a:fld>
             <a:endParaRPr lang="en-US"/>
           </a:p>
@@ -5568,7 +5568,7 @@
           <a:p>
             <a:r>
               <a:rPr lang="en-US" dirty="0"/>
-              <a:t>Lesson Objectives  UPDATE!</a:t>
+              <a:t>Lesson Objectives</a:t>
             </a:r>
           </a:p>
         </p:txBody>
@@ -5750,7 +5750,7 @@
           <a:p>
             <a:r>
               <a:rPr lang="en-US" dirty="0"/>
-              <a:t>Repeating code</a:t>
+              <a:t>If Then Blocks</a:t>
             </a:r>
           </a:p>
         </p:txBody>

</xml_diff>